<commit_message>
Added a new line: "New framework"
</commit_message>
<xml_diff>
--- a/Documents/Apresentação/Provenance_in_Games_1_Slide.pptx
+++ b/Documents/Apresentação/Provenance_in_Games_1_Slide.pptx
@@ -288,6 +288,7 @@
           <a:p>
             <a:fld id="{0EF0EEF0-A32C-4E5F-B949-74BE1D364500}" type="datetimeFigureOut">
               <a:rPr lang="en-US" smtClean="0"/>
+              <a:pPr/>
               <a:t>10/30/2012</a:t>
             </a:fld>
             <a:endParaRPr lang="en-US"/>
@@ -330,6 +331,7 @@
           <a:p>
             <a:fld id="{C55445F3-C4A9-49FA-9375-03E21EF78918}" type="slidenum">
               <a:rPr lang="en-US" smtClean="0"/>
+              <a:pPr/>
               <a:t>‹#›</a:t>
             </a:fld>
             <a:endParaRPr lang="en-US"/>
@@ -453,6 +455,7 @@
           <a:p>
             <a:fld id="{0EF0EEF0-A32C-4E5F-B949-74BE1D364500}" type="datetimeFigureOut">
               <a:rPr lang="en-US" smtClean="0"/>
+              <a:pPr/>
               <a:t>10/30/2012</a:t>
             </a:fld>
             <a:endParaRPr lang="en-US"/>
@@ -495,6 +498,7 @@
           <a:p>
             <a:fld id="{C55445F3-C4A9-49FA-9375-03E21EF78918}" type="slidenum">
               <a:rPr lang="en-US" smtClean="0"/>
+              <a:pPr/>
               <a:t>‹#›</a:t>
             </a:fld>
             <a:endParaRPr lang="en-US"/>
@@ -628,6 +632,7 @@
           <a:p>
             <a:fld id="{0EF0EEF0-A32C-4E5F-B949-74BE1D364500}" type="datetimeFigureOut">
               <a:rPr lang="en-US" smtClean="0"/>
+              <a:pPr/>
               <a:t>10/30/2012</a:t>
             </a:fld>
             <a:endParaRPr lang="en-US"/>
@@ -670,6 +675,7 @@
           <a:p>
             <a:fld id="{C55445F3-C4A9-49FA-9375-03E21EF78918}" type="slidenum">
               <a:rPr lang="en-US" smtClean="0"/>
+              <a:pPr/>
               <a:t>‹#›</a:t>
             </a:fld>
             <a:endParaRPr lang="en-US"/>
@@ -793,6 +799,7 @@
           <a:p>
             <a:fld id="{0EF0EEF0-A32C-4E5F-B949-74BE1D364500}" type="datetimeFigureOut">
               <a:rPr lang="en-US" smtClean="0"/>
+              <a:pPr/>
               <a:t>10/30/2012</a:t>
             </a:fld>
             <a:endParaRPr lang="en-US"/>
@@ -835,6 +842,7 @@
           <a:p>
             <a:fld id="{C55445F3-C4A9-49FA-9375-03E21EF78918}" type="slidenum">
               <a:rPr lang="en-US" smtClean="0"/>
+              <a:pPr/>
               <a:t>‹#›</a:t>
             </a:fld>
             <a:endParaRPr lang="en-US"/>
@@ -1034,6 +1042,7 @@
           <a:p>
             <a:fld id="{0EF0EEF0-A32C-4E5F-B949-74BE1D364500}" type="datetimeFigureOut">
               <a:rPr lang="en-US" smtClean="0"/>
+              <a:pPr/>
               <a:t>10/30/2012</a:t>
             </a:fld>
             <a:endParaRPr lang="en-US"/>
@@ -1076,6 +1085,7 @@
           <a:p>
             <a:fld id="{C55445F3-C4A9-49FA-9375-03E21EF78918}" type="slidenum">
               <a:rPr lang="en-US" smtClean="0"/>
+              <a:pPr/>
               <a:t>‹#›</a:t>
             </a:fld>
             <a:endParaRPr lang="en-US"/>
@@ -1317,6 +1327,7 @@
           <a:p>
             <a:fld id="{0EF0EEF0-A32C-4E5F-B949-74BE1D364500}" type="datetimeFigureOut">
               <a:rPr lang="en-US" smtClean="0"/>
+              <a:pPr/>
               <a:t>10/30/2012</a:t>
             </a:fld>
             <a:endParaRPr lang="en-US"/>
@@ -1359,6 +1370,7 @@
           <a:p>
             <a:fld id="{C55445F3-C4A9-49FA-9375-03E21EF78918}" type="slidenum">
               <a:rPr lang="en-US" smtClean="0"/>
+              <a:pPr/>
               <a:t>‹#›</a:t>
             </a:fld>
             <a:endParaRPr lang="en-US"/>
@@ -1734,6 +1746,7 @@
           <a:p>
             <a:fld id="{0EF0EEF0-A32C-4E5F-B949-74BE1D364500}" type="datetimeFigureOut">
               <a:rPr lang="en-US" smtClean="0"/>
+              <a:pPr/>
               <a:t>10/30/2012</a:t>
             </a:fld>
             <a:endParaRPr lang="en-US"/>
@@ -1776,6 +1789,7 @@
           <a:p>
             <a:fld id="{C55445F3-C4A9-49FA-9375-03E21EF78918}" type="slidenum">
               <a:rPr lang="en-US" smtClean="0"/>
+              <a:pPr/>
               <a:t>‹#›</a:t>
             </a:fld>
             <a:endParaRPr lang="en-US"/>
@@ -1847,6 +1861,7 @@
           <a:p>
             <a:fld id="{0EF0EEF0-A32C-4E5F-B949-74BE1D364500}" type="datetimeFigureOut">
               <a:rPr lang="en-US" smtClean="0"/>
+              <a:pPr/>
               <a:t>10/30/2012</a:t>
             </a:fld>
             <a:endParaRPr lang="en-US"/>
@@ -1889,6 +1904,7 @@
           <a:p>
             <a:fld id="{C55445F3-C4A9-49FA-9375-03E21EF78918}" type="slidenum">
               <a:rPr lang="en-US" smtClean="0"/>
+              <a:pPr/>
               <a:t>‹#›</a:t>
             </a:fld>
             <a:endParaRPr lang="en-US"/>
@@ -1937,6 +1953,7 @@
           <a:p>
             <a:fld id="{0EF0EEF0-A32C-4E5F-B949-74BE1D364500}" type="datetimeFigureOut">
               <a:rPr lang="en-US" smtClean="0"/>
+              <a:pPr/>
               <a:t>10/30/2012</a:t>
             </a:fld>
             <a:endParaRPr lang="en-US"/>
@@ -1979,6 +1996,7 @@
           <a:p>
             <a:fld id="{C55445F3-C4A9-49FA-9375-03E21EF78918}" type="slidenum">
               <a:rPr lang="en-US" smtClean="0"/>
+              <a:pPr/>
               <a:t>‹#›</a:t>
             </a:fld>
             <a:endParaRPr lang="en-US"/>
@@ -2209,6 +2227,7 @@
           <a:p>
             <a:fld id="{0EF0EEF0-A32C-4E5F-B949-74BE1D364500}" type="datetimeFigureOut">
               <a:rPr lang="en-US" smtClean="0"/>
+              <a:pPr/>
               <a:t>10/30/2012</a:t>
             </a:fld>
             <a:endParaRPr lang="en-US"/>
@@ -2251,6 +2270,7 @@
           <a:p>
             <a:fld id="{C55445F3-C4A9-49FA-9375-03E21EF78918}" type="slidenum">
               <a:rPr lang="en-US" smtClean="0"/>
+              <a:pPr/>
               <a:t>‹#›</a:t>
             </a:fld>
             <a:endParaRPr lang="en-US"/>
@@ -2457,6 +2477,7 @@
           <a:p>
             <a:fld id="{0EF0EEF0-A32C-4E5F-B949-74BE1D364500}" type="datetimeFigureOut">
               <a:rPr lang="en-US" smtClean="0"/>
+              <a:pPr/>
               <a:t>10/30/2012</a:t>
             </a:fld>
             <a:endParaRPr lang="en-US"/>
@@ -2499,6 +2520,7 @@
           <a:p>
             <a:fld id="{C55445F3-C4A9-49FA-9375-03E21EF78918}" type="slidenum">
               <a:rPr lang="en-US" smtClean="0"/>
+              <a:pPr/>
               <a:t>‹#›</a:t>
             </a:fld>
             <a:endParaRPr lang="en-US"/>
@@ -2665,6 +2687,7 @@
           <a:p>
             <a:fld id="{0EF0EEF0-A32C-4E5F-B949-74BE1D364500}" type="datetimeFigureOut">
               <a:rPr lang="en-US" smtClean="0"/>
+              <a:pPr/>
               <a:t>10/30/2012</a:t>
             </a:fld>
             <a:endParaRPr lang="en-US"/>
@@ -2743,6 +2766,7 @@
           <a:p>
             <a:fld id="{C55445F3-C4A9-49FA-9375-03E21EF78918}" type="slidenum">
               <a:rPr lang="en-US" smtClean="0"/>
+              <a:pPr/>
               <a:t>‹#›</a:t>
             </a:fld>
             <a:endParaRPr lang="en-US"/>
@@ -3090,14 +3114,26 @@
         </p:spPr>
         <p:txBody>
           <a:bodyPr>
-            <a:normAutofit fontScale="62500" lnSpcReduction="20000"/>
+            <a:normAutofit fontScale="55000" lnSpcReduction="20000"/>
           </a:bodyPr>
           <a:lstStyle/>
           <a:p>
             <a:r>
               <a:rPr lang="en-US" dirty="0" smtClean="0"/>
-              <a:t>Bring Provenance to Games</a:t>
-            </a:r>
+              <a:t>Bring Provenance to </a:t>
+            </a:r>
+            <a:r>
+              <a:rPr lang="en-US" dirty="0" smtClean="0"/>
+              <a:t>Games</a:t>
+            </a:r>
+          </a:p>
+          <a:p>
+            <a:pPr lvl="1"/>
+            <a:r>
+              <a:rPr lang="en-US" dirty="0" smtClean="0"/>
+              <a:t>New framework</a:t>
+            </a:r>
+            <a:endParaRPr lang="en-US" dirty="0" smtClean="0"/>
           </a:p>
           <a:p>
             <a:pPr lvl="1"/>

</xml_diff>